<commit_message>
updated result and code
</commit_message>
<xml_diff>
--- a/Random n-Polygon ngon Presentation CPSC 478 Spring 2015 .pptx
+++ b/Random n-Polygon ngon Presentation CPSC 478 Spring 2015 .pptx
@@ -10,8 +10,8 @@
     <p:sldId id="258" r:id="rId4"/>
     <p:sldId id="259" r:id="rId5"/>
     <p:sldId id="263" r:id="rId6"/>
-    <p:sldId id="260" r:id="rId7"/>
-    <p:sldId id="261" r:id="rId8"/>
+    <p:sldId id="261" r:id="rId7"/>
+    <p:sldId id="260" r:id="rId8"/>
     <p:sldId id="262" r:id="rId9"/>
     <p:sldId id="264" r:id="rId10"/>
     <p:sldId id="265" r:id="rId11"/>
@@ -123,14 +123,28 @@
             <p14:sldId id="258"/>
             <p14:sldId id="259"/>
             <p14:sldId id="263"/>
+            <p14:sldId id="261"/>
             <p14:sldId id="260"/>
-            <p14:sldId id="261"/>
             <p14:sldId id="262"/>
             <p14:sldId id="264"/>
             <p14:sldId id="265"/>
           </p14:sldIdLst>
         </p14:section>
       </p14:sectionLst>
+    </p:ext>
+    <p:ext uri="{EFAFB233-063F-42B5-8137-9DF3F51BA10A}">
+      <p15:sldGuideLst xmlns:p15="http://schemas.microsoft.com/office/powerpoint/2012/main" xmlns="">
+        <p15:guide id="1" orient="horz" pos="2160">
+          <p15:clr>
+            <a:srgbClr val="A4A3A4"/>
+          </p15:clr>
+        </p15:guide>
+        <p15:guide id="2" pos="2880">
+          <p15:clr>
+            <a:srgbClr val="A4A3A4"/>
+          </p15:clr>
+        </p15:guide>
+      </p15:sldGuideLst>
     </p:ext>
   </p:extLst>
 </p:presentation>
@@ -317,7 +331,7 @@
           <a:p>
             <a:fld id="{C2C21552-E954-4B1C-B30B-BD2D31EA191A}" type="datetimeFigureOut">
               <a:rPr lang="en-US" smtClean="0"/>
-              <a:t>5/5/2015</a:t>
+              <a:t>5/6/2015</a:t>
             </a:fld>
             <a:endParaRPr lang="en-US"/>
           </a:p>
@@ -487,7 +501,7 @@
           <a:p>
             <a:fld id="{C2C21552-E954-4B1C-B30B-BD2D31EA191A}" type="datetimeFigureOut">
               <a:rPr lang="en-US" smtClean="0"/>
-              <a:t>5/5/2015</a:t>
+              <a:t>5/6/2015</a:t>
             </a:fld>
             <a:endParaRPr lang="en-US"/>
           </a:p>
@@ -667,7 +681,7 @@
           <a:p>
             <a:fld id="{C2C21552-E954-4B1C-B30B-BD2D31EA191A}" type="datetimeFigureOut">
               <a:rPr lang="en-US" smtClean="0"/>
-              <a:t>5/5/2015</a:t>
+              <a:t>5/6/2015</a:t>
             </a:fld>
             <a:endParaRPr lang="en-US"/>
           </a:p>
@@ -837,7 +851,7 @@
           <a:p>
             <a:fld id="{C2C21552-E954-4B1C-B30B-BD2D31EA191A}" type="datetimeFigureOut">
               <a:rPr lang="en-US" smtClean="0"/>
-              <a:t>5/5/2015</a:t>
+              <a:t>5/6/2015</a:t>
             </a:fld>
             <a:endParaRPr lang="en-US"/>
           </a:p>
@@ -1083,7 +1097,7 @@
           <a:p>
             <a:fld id="{C2C21552-E954-4B1C-B30B-BD2D31EA191A}" type="datetimeFigureOut">
               <a:rPr lang="en-US" smtClean="0"/>
-              <a:t>5/5/2015</a:t>
+              <a:t>5/6/2015</a:t>
             </a:fld>
             <a:endParaRPr lang="en-US"/>
           </a:p>
@@ -1371,7 +1385,7 @@
           <a:p>
             <a:fld id="{C2C21552-E954-4B1C-B30B-BD2D31EA191A}" type="datetimeFigureOut">
               <a:rPr lang="en-US" smtClean="0"/>
-              <a:t>5/5/2015</a:t>
+              <a:t>5/6/2015</a:t>
             </a:fld>
             <a:endParaRPr lang="en-US"/>
           </a:p>
@@ -1793,7 +1807,7 @@
           <a:p>
             <a:fld id="{C2C21552-E954-4B1C-B30B-BD2D31EA191A}" type="datetimeFigureOut">
               <a:rPr lang="en-US" smtClean="0"/>
-              <a:t>5/5/2015</a:t>
+              <a:t>5/6/2015</a:t>
             </a:fld>
             <a:endParaRPr lang="en-US"/>
           </a:p>
@@ -1911,7 +1925,7 @@
           <a:p>
             <a:fld id="{C2C21552-E954-4B1C-B30B-BD2D31EA191A}" type="datetimeFigureOut">
               <a:rPr lang="en-US" smtClean="0"/>
-              <a:t>5/5/2015</a:t>
+              <a:t>5/6/2015</a:t>
             </a:fld>
             <a:endParaRPr lang="en-US"/>
           </a:p>
@@ -2006,7 +2020,7 @@
           <a:p>
             <a:fld id="{C2C21552-E954-4B1C-B30B-BD2D31EA191A}" type="datetimeFigureOut">
               <a:rPr lang="en-US" smtClean="0"/>
-              <a:t>5/5/2015</a:t>
+              <a:t>5/6/2015</a:t>
             </a:fld>
             <a:endParaRPr lang="en-US"/>
           </a:p>
@@ -2283,7 +2297,7 @@
           <a:p>
             <a:fld id="{C2C21552-E954-4B1C-B30B-BD2D31EA191A}" type="datetimeFigureOut">
               <a:rPr lang="en-US" smtClean="0"/>
-              <a:t>5/5/2015</a:t>
+              <a:t>5/6/2015</a:t>
             </a:fld>
             <a:endParaRPr lang="en-US"/>
           </a:p>
@@ -2536,7 +2550,7 @@
           <a:p>
             <a:fld id="{C2C21552-E954-4B1C-B30B-BD2D31EA191A}" type="datetimeFigureOut">
               <a:rPr lang="en-US" smtClean="0"/>
-              <a:t>5/5/2015</a:t>
+              <a:t>5/6/2015</a:t>
             </a:fld>
             <a:endParaRPr lang="en-US"/>
           </a:p>
@@ -2749,7 +2763,7 @@
           <a:p>
             <a:fld id="{C2C21552-E954-4B1C-B30B-BD2D31EA191A}" type="datetimeFigureOut">
               <a:rPr lang="en-US" smtClean="0"/>
-              <a:t>5/5/2015</a:t>
+              <a:t>5/6/2015</a:t>
             </a:fld>
             <a:endParaRPr lang="en-US"/>
           </a:p>
@@ -3776,12 +3790,7 @@
             <p:ph idx="1"/>
           </p:nvPr>
         </p:nvSpPr>
-        <p:spPr>
-          <a:xfrm>
-            <a:off x="457200" y="1371600"/>
-            <a:ext cx="8229600" cy="5029200"/>
-          </a:xfrm>
-        </p:spPr>
+        <p:spPr/>
         <p:txBody>
           <a:bodyPr>
             <a:normAutofit/>
@@ -3789,59 +3798,61 @@
           <a:lstStyle/>
           <a:p>
             <a:r>
+              <a:rPr lang="en-US" dirty="0" smtClean="0"/>
+              <a:t>Smaller n’s</a:t>
+            </a:r>
+          </a:p>
+          <a:p>
+            <a:pPr lvl="1"/>
+            <a:r>
+              <a:rPr lang="en-US" dirty="0" smtClean="0"/>
+              <a:t>Saw smaller improvements with </a:t>
+            </a:r>
+            <a:r>
+              <a:rPr lang="en-US" dirty="0" err="1" smtClean="0"/>
+              <a:t>quadtree</a:t>
+            </a:r>
+            <a:endParaRPr lang="en-US" dirty="0" smtClean="0"/>
+          </a:p>
+          <a:p>
+            <a:pPr lvl="1"/>
+            <a:r>
               <a:rPr lang="en-US" dirty="0" err="1" smtClean="0"/>
               <a:t>Quadtree</a:t>
             </a:r>
             <a:r>
               <a:rPr lang="en-US" dirty="0" smtClean="0"/>
-              <a:t> vs. </a:t>
-            </a:r>
-            <a:r>
-              <a:rPr lang="en-US" dirty="0" err="1" smtClean="0"/>
-              <a:t>bruteforce</a:t>
-            </a:r>
-            <a:r>
-              <a:rPr lang="en-US" dirty="0" smtClean="0"/>
-              <a:t> (n=1000)</a:t>
+              <a:t> complexity becomes negligible as n becomes large</a:t>
+            </a:r>
+          </a:p>
+          <a:p>
+            <a:r>
+              <a:rPr lang="en-US" smtClean="0"/>
+              <a:t>Limit </a:t>
+            </a:r>
+            <a:r>
+              <a:rPr lang="en-US" dirty="0" smtClean="0"/>
+              <a:t>Line Length</a:t>
             </a:r>
           </a:p>
           <a:p>
             <a:pPr lvl="1"/>
             <a:r>
               <a:rPr lang="en-US" dirty="0" smtClean="0"/>
-              <a:t>99% reduction in collision checks</a:t>
-            </a:r>
-          </a:p>
-          <a:p>
-            <a:pPr lvl="1"/>
-            <a:r>
-              <a:rPr lang="en-US" dirty="0" smtClean="0"/>
-              <a:t>91% reduction in running time</a:t>
-            </a:r>
-          </a:p>
-          <a:p>
-            <a:r>
-              <a:rPr lang="en-US" dirty="0" err="1" smtClean="0"/>
-              <a:t>Quadtree</a:t>
-            </a:r>
-            <a:r>
-              <a:rPr lang="en-US" dirty="0" smtClean="0"/>
-              <a:t> vs. Whitfield (n=1000)</a:t>
-            </a:r>
-          </a:p>
-          <a:p>
-            <a:pPr lvl="1"/>
-            <a:r>
-              <a:rPr lang="en-US" dirty="0" smtClean="0"/>
-              <a:t>80% reduction in running time</a:t>
-            </a:r>
+              <a:t>Between [1,100</a:t>
+            </a:r>
+            <a:r>
+              <a:rPr lang="en-US" dirty="0" smtClean="0"/>
+              <a:t>]</a:t>
+            </a:r>
+            <a:endParaRPr lang="en-US" dirty="0" smtClean="0"/>
           </a:p>
         </p:txBody>
       </p:sp>
     </p:spTree>
     <p:extLst>
       <p:ext uri="{BB962C8B-B14F-4D97-AF65-F5344CB8AC3E}">
-        <p14:creationId xmlns:p14="http://schemas.microsoft.com/office/powerpoint/2010/main" val="1324915200"/>
+        <p14:creationId xmlns:p14="http://schemas.microsoft.com/office/powerpoint/2010/main" val="485501472"/>
       </p:ext>
     </p:extLst>
   </p:cSld>
@@ -3901,63 +3912,94 @@
             <p:ph idx="1"/>
           </p:nvPr>
         </p:nvSpPr>
-        <p:spPr/>
+        <p:spPr>
+          <a:xfrm>
+            <a:off x="457200" y="1371600"/>
+            <a:ext cx="8229600" cy="5029200"/>
+          </a:xfrm>
+        </p:spPr>
         <p:txBody>
           <a:bodyPr>
-            <a:normAutofit/>
+            <a:normAutofit lnSpcReduction="10000"/>
           </a:bodyPr>
           <a:lstStyle/>
           <a:p>
-            <a:r>
-              <a:rPr lang="en-US" dirty="0" smtClean="0"/>
-              <a:t>Smaller n’s</a:t>
-            </a:r>
-          </a:p>
-          <a:p>
-            <a:pPr lvl="1"/>
-            <a:r>
-              <a:rPr lang="en-US" dirty="0" smtClean="0"/>
-              <a:t>Saw smaller improvements with </a:t>
-            </a:r>
-            <a:r>
-              <a:rPr lang="en-US" dirty="0" err="1" smtClean="0"/>
-              <a:t>quadtree</a:t>
-            </a:r>
-            <a:endParaRPr lang="en-US" dirty="0" smtClean="0"/>
-          </a:p>
-          <a:p>
-            <a:pPr lvl="1"/>
             <a:r>
               <a:rPr lang="en-US" dirty="0" err="1" smtClean="0"/>
               <a:t>Quadtree</a:t>
             </a:r>
             <a:r>
               <a:rPr lang="en-US" dirty="0" smtClean="0"/>
-              <a:t> complexity becomes negligible as n becomes large</a:t>
-            </a:r>
-          </a:p>
-          <a:p>
-            <a:r>
-              <a:rPr lang="en-US" dirty="0" smtClean="0"/>
-              <a:t>Limiting Line Length</a:t>
+              <a:t> vs. </a:t>
+            </a:r>
+            <a:r>
+              <a:rPr lang="en-US" dirty="0" err="1" smtClean="0"/>
+              <a:t>bruteforce</a:t>
+            </a:r>
+            <a:r>
+              <a:rPr lang="en-US" dirty="0" smtClean="0"/>
+              <a:t> (n=1000)</a:t>
             </a:r>
           </a:p>
           <a:p>
             <a:pPr lvl="1"/>
             <a:r>
               <a:rPr lang="en-US" dirty="0" smtClean="0"/>
-              <a:t>Between [1,100]</a:t>
+              <a:t>78</a:t>
+            </a:r>
+            <a:r>
+              <a:rPr lang="en-US" dirty="0" smtClean="0"/>
+              <a:t>% </a:t>
+            </a:r>
+            <a:r>
+              <a:rPr lang="en-US" dirty="0" smtClean="0"/>
+              <a:t>reduction in collision checks</a:t>
             </a:r>
           </a:p>
           <a:p>
             <a:pPr lvl="1"/>
             <a:r>
               <a:rPr lang="en-US" dirty="0" smtClean="0"/>
-              <a:t>92% reduction in runtime for </a:t>
-            </a:r>
+              <a:t>40</a:t>
+            </a:r>
+            <a:r>
+              <a:rPr lang="en-US" dirty="0" smtClean="0"/>
+              <a:t>% </a:t>
+            </a:r>
+            <a:r>
+              <a:rPr lang="en-US" dirty="0" smtClean="0"/>
+              <a:t>reduction in running time</a:t>
+            </a:r>
+          </a:p>
+          <a:p>
             <a:r>
               <a:rPr lang="en-US" dirty="0" err="1" smtClean="0"/>
-              <a:t>quadtree</a:t>
+              <a:t>Quadtree</a:t>
+            </a:r>
+            <a:r>
+              <a:rPr lang="en-US" dirty="0" smtClean="0"/>
+              <a:t> vs. Whitfield (n=1000)</a:t>
+            </a:r>
+          </a:p>
+          <a:p>
+            <a:pPr lvl="1"/>
+            <a:r>
+              <a:rPr lang="en-US" dirty="0" smtClean="0"/>
+              <a:t>80% reduction in running time</a:t>
+            </a:r>
+          </a:p>
+          <a:p>
+            <a:pPr lvl="1"/>
+            <a:endParaRPr lang="en-US" dirty="0"/>
+          </a:p>
+          <a:p>
+            <a:r>
+              <a:rPr lang="en-US" dirty="0" smtClean="0"/>
+              <a:t>Collision checking now takes &lt; </a:t>
+            </a:r>
+            <a:r>
+              <a:rPr lang="en-US" dirty="0" smtClean="0"/>
+              <a:t>O(n^2)</a:t>
             </a:r>
             <a:endParaRPr lang="en-US" dirty="0" smtClean="0"/>
           </a:p>
@@ -3965,7 +4007,14 @@
             <a:pPr lvl="1"/>
             <a:r>
               <a:rPr lang="en-US" dirty="0" smtClean="0"/>
-              <a:t>73% reduction in runtime for brute-force</a:t>
+              <a:t>One check for each of the two new lines</a:t>
+            </a:r>
+          </a:p>
+          <a:p>
+            <a:pPr lvl="1"/>
+            <a:r>
+              <a:rPr lang="en-US" dirty="0" smtClean="0"/>
+              <a:t>Each lines could be in a quadrant that requires all lines to be checked (very unlikely)</a:t>
             </a:r>
           </a:p>
         </p:txBody>
@@ -3973,7 +4022,7 @@
     </p:spTree>
     <p:extLst>
       <p:ext uri="{BB962C8B-B14F-4D97-AF65-F5344CB8AC3E}">
-        <p14:creationId xmlns:p14="http://schemas.microsoft.com/office/powerpoint/2010/main" val="485501472"/>
+        <p14:creationId xmlns:p14="http://schemas.microsoft.com/office/powerpoint/2010/main" val="1324915200"/>
       </p:ext>
     </p:extLst>
   </p:cSld>

</xml_diff>